<commit_message>
Updated pptx and ReadMe file.
</commit_message>
<xml_diff>
--- a/docs/pinguinoReale_echoBazaar.pptx
+++ b/docs/pinguinoReale_echoBazaar.pptx
@@ -7548,7 +7548,7 @@
           <a:p>
             <a:fld id="{FAE6BAD6-66A1-4A99-88F3-8D055447D9CA}" type="datetimeFigureOut">
               <a:rPr lang="en-GB" smtClean="0"/>
-              <a:t>16/05/2024</a:t>
+              <a:t>22/05/2024</a:t>
             </a:fld>
             <a:endParaRPr lang="en-GB"/>
           </a:p>
@@ -7758,7 +7758,7 @@
           <a:p>
             <a:fld id="{FAE6BAD6-66A1-4A99-88F3-8D055447D9CA}" type="datetimeFigureOut">
               <a:rPr lang="en-GB" smtClean="0"/>
-              <a:t>16/05/2024</a:t>
+              <a:t>22/05/2024</a:t>
             </a:fld>
             <a:endParaRPr lang="en-GB"/>
           </a:p>
@@ -7978,7 +7978,7 @@
           <a:p>
             <a:fld id="{FAE6BAD6-66A1-4A99-88F3-8D055447D9CA}" type="datetimeFigureOut">
               <a:rPr lang="en-GB" smtClean="0"/>
-              <a:t>16/05/2024</a:t>
+              <a:t>22/05/2024</a:t>
             </a:fld>
             <a:endParaRPr lang="en-GB"/>
           </a:p>
@@ -8188,7 +8188,7 @@
           <a:p>
             <a:fld id="{FAE6BAD6-66A1-4A99-88F3-8D055447D9CA}" type="datetimeFigureOut">
               <a:rPr lang="en-GB" smtClean="0"/>
-              <a:t>16/05/2024</a:t>
+              <a:t>22/05/2024</a:t>
             </a:fld>
             <a:endParaRPr lang="en-GB"/>
           </a:p>
@@ -8475,7 +8475,7 @@
           <a:p>
             <a:fld id="{FAE6BAD6-66A1-4A99-88F3-8D055447D9CA}" type="datetimeFigureOut">
               <a:rPr lang="en-GB" smtClean="0"/>
-              <a:t>16/05/2024</a:t>
+              <a:t>22/05/2024</a:t>
             </a:fld>
             <a:endParaRPr lang="en-GB"/>
           </a:p>
@@ -8752,7 +8752,7 @@
           <a:p>
             <a:fld id="{FAE6BAD6-66A1-4A99-88F3-8D055447D9CA}" type="datetimeFigureOut">
               <a:rPr lang="en-GB" smtClean="0"/>
-              <a:t>16/05/2024</a:t>
+              <a:t>22/05/2024</a:t>
             </a:fld>
             <a:endParaRPr lang="en-GB"/>
           </a:p>
@@ -9176,7 +9176,7 @@
           <a:p>
             <a:fld id="{FAE6BAD6-66A1-4A99-88F3-8D055447D9CA}" type="datetimeFigureOut">
               <a:rPr lang="en-GB" smtClean="0"/>
-              <a:t>16/05/2024</a:t>
+              <a:t>22/05/2024</a:t>
             </a:fld>
             <a:endParaRPr lang="en-GB"/>
           </a:p>
@@ -9329,7 +9329,7 @@
           <a:p>
             <a:fld id="{FAE6BAD6-66A1-4A99-88F3-8D055447D9CA}" type="datetimeFigureOut">
               <a:rPr lang="en-GB" smtClean="0"/>
-              <a:t>16/05/2024</a:t>
+              <a:t>22/05/2024</a:t>
             </a:fld>
             <a:endParaRPr lang="en-GB"/>
           </a:p>
@@ -9454,7 +9454,7 @@
           <a:p>
             <a:fld id="{FAE6BAD6-66A1-4A99-88F3-8D055447D9CA}" type="datetimeFigureOut">
               <a:rPr lang="en-GB" smtClean="0"/>
-              <a:t>16/05/2024</a:t>
+              <a:t>22/05/2024</a:t>
             </a:fld>
             <a:endParaRPr lang="en-GB"/>
           </a:p>
@@ -9777,7 +9777,7 @@
           <a:p>
             <a:fld id="{FAE6BAD6-66A1-4A99-88F3-8D055447D9CA}" type="datetimeFigureOut">
               <a:rPr lang="en-GB" smtClean="0"/>
-              <a:t>16/05/2024</a:t>
+              <a:t>22/05/2024</a:t>
             </a:fld>
             <a:endParaRPr lang="en-GB"/>
           </a:p>
@@ -10077,7 +10077,7 @@
           <a:p>
             <a:fld id="{FAE6BAD6-66A1-4A99-88F3-8D055447D9CA}" type="datetimeFigureOut">
               <a:rPr lang="en-GB" smtClean="0"/>
-              <a:t>16/05/2024</a:t>
+              <a:t>22/05/2024</a:t>
             </a:fld>
             <a:endParaRPr lang="en-GB"/>
           </a:p>
@@ -10330,7 +10330,7 @@
           <a:p>
             <a:fld id="{FAE6BAD6-66A1-4A99-88F3-8D055447D9CA}" type="datetimeFigureOut">
               <a:rPr lang="en-GB" smtClean="0"/>
-              <a:t>16/05/2024</a:t>
+              <a:t>22/05/2024</a:t>
             </a:fld>
             <a:endParaRPr lang="en-GB"/>
           </a:p>

</xml_diff>